<commit_message>
Ajuste icone pag sobre
</commit_message>
<xml_diff>
--- a/docs/apresentacao/Apresentação - Sprint 4.pptx
+++ b/docs/apresentacao/Apresentação - Sprint 4.pptx
@@ -124,6 +124,51 @@
     </a:lvl9pPr>
   </p:defaultTextStyle>
   <p:extLst>
+    <p:ext uri="{521415D9-36F7-43E2-AB2F-B90AF26B5E84}">
+      <p14:sectionLst xmlns:p14="http://schemas.microsoft.com/office/powerpoint/2010/main">
+        <p14:section name="Guilherme" id="{0EA03FC5-5E42-424A-9403-A9A21A5A14FA}">
+          <p14:sldIdLst>
+            <p14:sldId id="298"/>
+          </p14:sldIdLst>
+        </p14:section>
+        <p14:section name="Renato" id="{25246688-C2C5-48D7-83FD-2D96F7D9E44F}">
+          <p14:sldIdLst>
+            <p14:sldId id="261"/>
+            <p14:sldId id="300"/>
+            <p14:sldId id="267"/>
+            <p14:sldId id="299"/>
+          </p14:sldIdLst>
+        </p14:section>
+        <p14:section name="Mateus" id="{8FB30D9F-4830-4436-9559-E968BE6D1B59}">
+          <p14:sldIdLst>
+            <p14:sldId id="302"/>
+            <p14:sldId id="275"/>
+          </p14:sldIdLst>
+        </p14:section>
+        <p14:section name="Arthur" id="{CE35C075-E57C-4AFF-A4EA-66952C9424F9}">
+          <p14:sldIdLst>
+            <p14:sldId id="263"/>
+            <p14:sldId id="270"/>
+            <p14:sldId id="303"/>
+            <p14:sldId id="291"/>
+            <p14:sldId id="297"/>
+          </p14:sldIdLst>
+        </p14:section>
+        <p14:section name="Guilherme" id="{62EB408F-54DC-4E75-90FC-07CF8EC5F667}">
+          <p14:sldIdLst>
+            <p14:sldId id="265"/>
+            <p14:sldId id="305"/>
+            <p14:sldId id="301"/>
+          </p14:sldIdLst>
+        </p14:section>
+        <p14:section name="Miguel" id="{5F9BD118-C500-4B88-9549-E152647E2E1A}">
+          <p14:sldIdLst>
+            <p14:sldId id="304"/>
+            <p14:sldId id="289"/>
+          </p14:sldIdLst>
+        </p14:section>
+      </p14:sectionLst>
+    </p:ext>
     <p:ext uri="{EFAFB233-063F-42B5-8137-9DF3F51BA10A}">
       <p15:sldGuideLst xmlns:p15="http://schemas.microsoft.com/office/powerpoint/2012/main">
         <p15:guide id="1" orient="horz" pos="2160" userDrawn="1">
@@ -180,14 +225,6 @@
 </p:presentation>
 </file>
 
-<file path=ppt/revisionInfo.xml><?xml version="1.0" encoding="utf-8"?>
-<p1510:revInfo xmlns:a="http://schemas.openxmlformats.org/drawingml/2006/main" xmlns:r="http://schemas.openxmlformats.org/officeDocument/2006/relationships" xmlns:p1510="http://schemas.microsoft.com/office/powerpoint/2015/10/main">
-  <p1510:revLst>
-    <p1510:client id="{957C50AA-5744-4113-8340-ECEE95D7512C}" v="79" dt="2022-12-04T14:38:09.512"/>
-  </p1510:revLst>
-</p1510:revInfo>
-</file>
-
 <file path=ppt/changesInfos/changesInfo1.xml><?xml version="1.0" encoding="utf-8"?>
 <pc:chgInfo xmlns:a="http://schemas.openxmlformats.org/drawingml/2006/main" xmlns:r="http://schemas.openxmlformats.org/officeDocument/2006/relationships" xmlns:ac="http://schemas.microsoft.com/office/drawing/2013/main/command" xmlns:pc="http://schemas.microsoft.com/office/powerpoint/2013/main/command">
   <pc:docChgLst>
@@ -1007,8 +1044,8 @@
   </pc:docChgLst>
   <pc:docChgLst>
     <pc:chgData name="Guilherme Lage da Costa" userId="e66f0b7e9f7bd981" providerId="LiveId" clId="{E2F8200A-1438-4883-B976-5D75DF02623E}"/>
-    <pc:docChg chg="undo custSel addSld delSld modSld sldOrd">
-      <pc:chgData name="Guilherme Lage da Costa" userId="e66f0b7e9f7bd981" providerId="LiveId" clId="{E2F8200A-1438-4883-B976-5D75DF02623E}" dt="2022-11-28T19:21:07.857" v="1939"/>
+    <pc:docChg chg="undo custSel addSld delSld modSld sldOrd addSection modSection">
+      <pc:chgData name="Guilherme Lage da Costa" userId="e66f0b7e9f7bd981" providerId="LiveId" clId="{E2F8200A-1438-4883-B976-5D75DF02623E}" dt="2022-12-06T19:07:17.801" v="1951" actId="17846"/>
       <pc:docMkLst>
         <pc:docMk/>
       </pc:docMkLst>
@@ -4543,7 +4580,7 @@
           <a:p>
             <a:fld id="{9ADEABF0-8893-4851-98F8-C781AE5C67F4}" type="datetimeFigureOut">
               <a:rPr lang="pt-BR" smtClean="0"/>
-              <a:t>04/12/2022</a:t>
+              <a:t>06/12/2022</a:t>
             </a:fld>
             <a:endParaRPr lang="pt-BR"/>
           </a:p>
@@ -4957,7 +4994,7 @@
           <a:p>
             <a:fld id="{B1F8A8AF-FE0F-45AB-9FDA-53617E809FA8}" type="datetimeFigureOut">
               <a:rPr lang="pt-BR" smtClean="0"/>
-              <a:t>04/12/2022</a:t>
+              <a:t>06/12/2022</a:t>
             </a:fld>
             <a:endParaRPr lang="pt-BR"/>
           </a:p>
@@ -5155,7 +5192,7 @@
           <a:p>
             <a:fld id="{B1F8A8AF-FE0F-45AB-9FDA-53617E809FA8}" type="datetimeFigureOut">
               <a:rPr lang="pt-BR" smtClean="0"/>
-              <a:t>04/12/2022</a:t>
+              <a:t>06/12/2022</a:t>
             </a:fld>
             <a:endParaRPr lang="pt-BR"/>
           </a:p>
@@ -5363,7 +5400,7 @@
           <a:p>
             <a:fld id="{B1F8A8AF-FE0F-45AB-9FDA-53617E809FA8}" type="datetimeFigureOut">
               <a:rPr lang="pt-BR" smtClean="0"/>
-              <a:t>04/12/2022</a:t>
+              <a:t>06/12/2022</a:t>
             </a:fld>
             <a:endParaRPr lang="pt-BR"/>
           </a:p>
@@ -5561,7 +5598,7 @@
           <a:p>
             <a:fld id="{B1F8A8AF-FE0F-45AB-9FDA-53617E809FA8}" type="datetimeFigureOut">
               <a:rPr lang="pt-BR" smtClean="0"/>
-              <a:t>04/12/2022</a:t>
+              <a:t>06/12/2022</a:t>
             </a:fld>
             <a:endParaRPr lang="pt-BR"/>
           </a:p>
@@ -5836,7 +5873,7 @@
           <a:p>
             <a:fld id="{B1F8A8AF-FE0F-45AB-9FDA-53617E809FA8}" type="datetimeFigureOut">
               <a:rPr lang="pt-BR" smtClean="0"/>
-              <a:t>04/12/2022</a:t>
+              <a:t>06/12/2022</a:t>
             </a:fld>
             <a:endParaRPr lang="pt-BR"/>
           </a:p>
@@ -6101,7 +6138,7 @@
           <a:p>
             <a:fld id="{B1F8A8AF-FE0F-45AB-9FDA-53617E809FA8}" type="datetimeFigureOut">
               <a:rPr lang="pt-BR" smtClean="0"/>
-              <a:t>04/12/2022</a:t>
+              <a:t>06/12/2022</a:t>
             </a:fld>
             <a:endParaRPr lang="pt-BR"/>
           </a:p>
@@ -6513,7 +6550,7 @@
           <a:p>
             <a:fld id="{B1F8A8AF-FE0F-45AB-9FDA-53617E809FA8}" type="datetimeFigureOut">
               <a:rPr lang="pt-BR" smtClean="0"/>
-              <a:t>04/12/2022</a:t>
+              <a:t>06/12/2022</a:t>
             </a:fld>
             <a:endParaRPr lang="pt-BR"/>
           </a:p>
@@ -6654,7 +6691,7 @@
           <a:p>
             <a:fld id="{B1F8A8AF-FE0F-45AB-9FDA-53617E809FA8}" type="datetimeFigureOut">
               <a:rPr lang="pt-BR" smtClean="0"/>
-              <a:t>04/12/2022</a:t>
+              <a:t>06/12/2022</a:t>
             </a:fld>
             <a:endParaRPr lang="pt-BR"/>
           </a:p>
@@ -6767,7 +6804,7 @@
           <a:p>
             <a:fld id="{B1F8A8AF-FE0F-45AB-9FDA-53617E809FA8}" type="datetimeFigureOut">
               <a:rPr lang="pt-BR" smtClean="0"/>
-              <a:t>04/12/2022</a:t>
+              <a:t>06/12/2022</a:t>
             </a:fld>
             <a:endParaRPr lang="pt-BR"/>
           </a:p>
@@ -7078,7 +7115,7 @@
           <a:p>
             <a:fld id="{B1F8A8AF-FE0F-45AB-9FDA-53617E809FA8}" type="datetimeFigureOut">
               <a:rPr lang="pt-BR" smtClean="0"/>
-              <a:t>04/12/2022</a:t>
+              <a:t>06/12/2022</a:t>
             </a:fld>
             <a:endParaRPr lang="pt-BR"/>
           </a:p>
@@ -7366,7 +7403,7 @@
           <a:p>
             <a:fld id="{B1F8A8AF-FE0F-45AB-9FDA-53617E809FA8}" type="datetimeFigureOut">
               <a:rPr lang="pt-BR" smtClean="0"/>
-              <a:t>04/12/2022</a:t>
+              <a:t>06/12/2022</a:t>
             </a:fld>
             <a:endParaRPr lang="pt-BR"/>
           </a:p>
@@ -7607,7 +7644,7 @@
           <a:p>
             <a:fld id="{B1F8A8AF-FE0F-45AB-9FDA-53617E809FA8}" type="datetimeFigureOut">
               <a:rPr lang="pt-BR" smtClean="0"/>
-              <a:t>04/12/2022</a:t>
+              <a:t>06/12/2022</a:t>
             </a:fld>
             <a:endParaRPr lang="pt-BR"/>
           </a:p>

</xml_diff>